<commit_message>
Updated the workshop presentation
</commit_message>
<xml_diff>
--- a/doc/Demos/Workshop/Workshop presentation.pptx
+++ b/doc/Demos/Workshop/Workshop presentation.pptx
@@ -5,20 +5,21 @@
     <p:sldMasterId id="2147483651" r:id="rId1"/>
   </p:sldMasterIdLst>
   <p:notesMasterIdLst>
-    <p:notesMasterId r:id="rId10"/>
+    <p:notesMasterId r:id="rId11"/>
   </p:notesMasterIdLst>
   <p:handoutMasterIdLst>
-    <p:handoutMasterId r:id="rId11"/>
+    <p:handoutMasterId r:id="rId12"/>
   </p:handoutMasterIdLst>
   <p:sldIdLst>
     <p:sldId id="341" r:id="rId2"/>
     <p:sldId id="344" r:id="rId3"/>
-    <p:sldId id="352" r:id="rId4"/>
-    <p:sldId id="354" r:id="rId5"/>
-    <p:sldId id="346" r:id="rId6"/>
-    <p:sldId id="353" r:id="rId7"/>
+    <p:sldId id="355" r:id="rId4"/>
+    <p:sldId id="352" r:id="rId5"/>
+    <p:sldId id="354" r:id="rId6"/>
+    <p:sldId id="346" r:id="rId7"/>
     <p:sldId id="348" r:id="rId8"/>
-    <p:sldId id="345" r:id="rId9"/>
+    <p:sldId id="353" r:id="rId9"/>
+    <p:sldId id="345" r:id="rId10"/>
   </p:sldIdLst>
   <p:sldSz cx="9144000" cy="6858000" type="screen4x3"/>
   <p:notesSz cx="6797675" cy="9928225"/>
@@ -362,7 +363,7 @@
     </p:spTree>
     <p:extLst>
       <p:ext uri="{BB962C8B-B14F-4D97-AF65-F5344CB8AC3E}">
-        <p14:creationId xmlns:p14="http://schemas.microsoft.com/office/powerpoint/2010/main" xmlns="" val="4143692976"/>
+        <p14:creationId xmlns="" xmlns:p14="http://schemas.microsoft.com/office/powerpoint/2010/main" val="4143692976"/>
       </p:ext>
     </p:extLst>
   </p:cSld>
@@ -638,7 +639,7 @@
     </p:spTree>
     <p:extLst>
       <p:ext uri="{BB962C8B-B14F-4D97-AF65-F5344CB8AC3E}">
-        <p14:creationId xmlns:p14="http://schemas.microsoft.com/office/powerpoint/2010/main" xmlns="" val="3457761270"/>
+        <p14:creationId xmlns="" xmlns:p14="http://schemas.microsoft.com/office/powerpoint/2010/main" val="3457761270"/>
       </p:ext>
     </p:extLst>
   </p:cSld>
@@ -1030,212 +1031,9 @@
             <a:pPr algn="just">
               <a:buNone/>
             </a:pPr>
-            <a:r>
-              <a:rPr lang="nl-NL" dirty="0" smtClean="0">
-                <a:hlinkClick r:id="rId3"/>
-              </a:rPr>
-              <a:t>http://yuml.me/diagram/scruffy;dir:td/class/draw</a:t>
-            </a:r>
-            <a:endParaRPr lang="nl-NL" dirty="0" smtClean="0"/>
-          </a:p>
-          <a:p>
-            <a:pPr algn="just">
-              <a:buNone/>
-            </a:pPr>
-            <a:r>
-              <a:rPr lang="nl-NL" dirty="0" smtClean="0">
-                <a:cs typeface="Arial" charset="0"/>
-              </a:rPr>
-              <a:t># Kinect Diagram</a:t>
-            </a:r>
-          </a:p>
-          <a:p>
-            <a:pPr algn="just">
-              <a:buNone/>
-            </a:pPr>
-            <a:r>
-              <a:rPr lang="nl-NL" dirty="0" smtClean="0">
-                <a:cs typeface="Arial" charset="0"/>
-              </a:rPr>
-              <a:t>[</a:t>
-            </a:r>
-            <a:r>
-              <a:rPr lang="nl-NL" dirty="0" err="1" smtClean="0">
-                <a:cs typeface="Arial" charset="0"/>
-              </a:rPr>
-              <a:t>Kinect.Core</a:t>
-            </a:r>
-            <a:r>
-              <a:rPr lang="nl-NL" dirty="0" smtClean="0">
-                <a:cs typeface="Arial" charset="0"/>
-              </a:rPr>
-              <a:t>]</a:t>
-            </a:r>
-            <a:r>
-              <a:rPr lang="nl-NL" dirty="0" err="1" smtClean="0">
-                <a:cs typeface="Arial" charset="0"/>
-              </a:rPr>
-              <a:t>uses-</a:t>
-            </a:r>
-            <a:r>
-              <a:rPr lang="nl-NL" dirty="0" smtClean="0">
-                <a:cs typeface="Arial" charset="0"/>
-              </a:rPr>
-              <a:t>.-&gt;[</a:t>
-            </a:r>
-            <a:r>
-              <a:rPr lang="nl-NL" dirty="0" err="1" smtClean="0">
-                <a:cs typeface="Arial" charset="0"/>
-              </a:rPr>
-              <a:t>HiddenMarkovModel</a:t>
-            </a:r>
-            <a:r>
-              <a:rPr lang="nl-NL" dirty="0" smtClean="0">
-                <a:cs typeface="Arial" charset="0"/>
-              </a:rPr>
-              <a:t>]</a:t>
-            </a:r>
-          </a:p>
-          <a:p>
-            <a:pPr algn="just">
-              <a:buNone/>
-            </a:pPr>
-            <a:r>
-              <a:rPr lang="nl-NL" dirty="0" smtClean="0">
-                <a:cs typeface="Arial" charset="0"/>
-              </a:rPr>
-              <a:t>[</a:t>
-            </a:r>
-            <a:r>
-              <a:rPr lang="nl-NL" dirty="0" err="1" smtClean="0">
-                <a:cs typeface="Arial" charset="0"/>
-              </a:rPr>
-              <a:t>Kinect.Core</a:t>
-            </a:r>
-            <a:r>
-              <a:rPr lang="nl-NL" dirty="0" smtClean="0">
-                <a:cs typeface="Arial" charset="0"/>
-              </a:rPr>
-              <a:t>]</a:t>
-            </a:r>
-            <a:r>
-              <a:rPr lang="nl-NL" dirty="0" err="1" smtClean="0">
-                <a:cs typeface="Arial" charset="0"/>
-              </a:rPr>
-              <a:t>uses-</a:t>
-            </a:r>
-            <a:r>
-              <a:rPr lang="nl-NL" dirty="0" smtClean="0">
-                <a:cs typeface="Arial" charset="0"/>
-              </a:rPr>
-              <a:t>.-&gt;[</a:t>
-            </a:r>
-            <a:r>
-              <a:rPr lang="nl-NL" dirty="0" err="1" smtClean="0">
-                <a:cs typeface="Arial" charset="0"/>
-              </a:rPr>
-              <a:t>Common</a:t>
-            </a:r>
-            <a:r>
-              <a:rPr lang="nl-NL" dirty="0" smtClean="0">
-                <a:cs typeface="Arial" charset="0"/>
-              </a:rPr>
-              <a:t>]</a:t>
-            </a:r>
-          </a:p>
-          <a:p>
-            <a:pPr algn="just">
-              <a:buNone/>
-            </a:pPr>
-            <a:r>
-              <a:rPr lang="nl-NL" dirty="0" smtClean="0">
-                <a:cs typeface="Arial" charset="0"/>
-              </a:rPr>
-              <a:t>[</a:t>
-            </a:r>
-            <a:r>
-              <a:rPr lang="nl-NL" dirty="0" err="1" smtClean="0">
-                <a:cs typeface="Arial" charset="0"/>
-              </a:rPr>
-              <a:t>Kinect.WPF</a:t>
-            </a:r>
-            <a:r>
-              <a:rPr lang="nl-NL" dirty="0" smtClean="0">
-                <a:cs typeface="Arial" charset="0"/>
-              </a:rPr>
-              <a:t>]</a:t>
-            </a:r>
-            <a:r>
-              <a:rPr lang="nl-NL" dirty="0" err="1" smtClean="0">
-                <a:cs typeface="Arial" charset="0"/>
-              </a:rPr>
-              <a:t>uses-</a:t>
-            </a:r>
-            <a:r>
-              <a:rPr lang="nl-NL" dirty="0" smtClean="0">
-                <a:cs typeface="Arial" charset="0"/>
-              </a:rPr>
-              <a:t>.-&gt;[</a:t>
-            </a:r>
-            <a:r>
-              <a:rPr lang="nl-NL" dirty="0" err="1" smtClean="0">
-                <a:cs typeface="Arial" charset="0"/>
-              </a:rPr>
-              <a:t>Common</a:t>
-            </a:r>
-            <a:r>
-              <a:rPr lang="nl-NL" dirty="0" smtClean="0">
-                <a:cs typeface="Arial" charset="0"/>
-              </a:rPr>
-              <a:t>]</a:t>
-            </a:r>
-          </a:p>
-          <a:p>
-            <a:pPr algn="just">
-              <a:buNone/>
-            </a:pPr>
-            <a:r>
-              <a:rPr lang="nl-NL" dirty="0" smtClean="0">
-                <a:cs typeface="Arial" charset="0"/>
-              </a:rPr>
-              <a:t>[</a:t>
-            </a:r>
-            <a:r>
-              <a:rPr lang="nl-NL" dirty="0" err="1" smtClean="0">
-                <a:cs typeface="Arial" charset="0"/>
-              </a:rPr>
-              <a:t>Kinect.WPF</a:t>
-            </a:r>
-            <a:r>
-              <a:rPr lang="nl-NL" dirty="0" smtClean="0">
-                <a:cs typeface="Arial" charset="0"/>
-              </a:rPr>
-              <a:t>]</a:t>
-            </a:r>
-            <a:r>
-              <a:rPr lang="nl-NL" dirty="0" err="1" smtClean="0">
-                <a:cs typeface="Arial" charset="0"/>
-              </a:rPr>
-              <a:t>uses-</a:t>
-            </a:r>
-            <a:r>
-              <a:rPr lang="nl-NL" dirty="0" smtClean="0">
-                <a:cs typeface="Arial" charset="0"/>
-              </a:rPr>
-              <a:t>.-&gt;[</a:t>
-            </a:r>
-            <a:r>
-              <a:rPr lang="nl-NL" dirty="0" err="1" smtClean="0">
-                <a:cs typeface="Arial" charset="0"/>
-              </a:rPr>
-              <a:t>Kinect.Core</a:t>
-            </a:r>
-            <a:r>
-              <a:rPr lang="nl-NL" dirty="0" smtClean="0">
-                <a:cs typeface="Arial" charset="0"/>
-              </a:rPr>
-              <a:t>]</a:t>
-            </a:r>
+            <a:endParaRPr lang="nl-NL" dirty="0">
+              <a:cs typeface="Arial" charset="0"/>
+            </a:endParaRPr>
           </a:p>
         </p:txBody>
       </p:sp>
@@ -1348,7 +1146,7 @@
               <a:rPr lang="nl-NL" dirty="0" smtClean="0">
                 <a:cs typeface="Arial" charset="0"/>
               </a:rPr>
-              <a:t># Cool UML Diagram</a:t>
+              <a:t># Kinect Diagram</a:t>
             </a:r>
           </a:p>
           <a:p>
@@ -1436,7 +1234,7 @@
               <a:rPr lang="nl-NL" dirty="0" err="1" smtClean="0">
                 <a:cs typeface="Arial" charset="0"/>
               </a:rPr>
-              <a:t>Kinect.Common</a:t>
+              <a:t>Common</a:t>
             </a:r>
             <a:r>
               <a:rPr lang="nl-NL" dirty="0" smtClean="0">
@@ -1459,7 +1257,7 @@
               <a:rPr lang="nl-NL" dirty="0" err="1" smtClean="0">
                 <a:cs typeface="Arial" charset="0"/>
               </a:rPr>
-              <a:t>Kinect.Service</a:t>
+              <a:t>Kinect.WPF</a:t>
             </a:r>
             <a:r>
               <a:rPr lang="nl-NL" dirty="0" smtClean="0">
@@ -1483,7 +1281,7 @@
               <a:rPr lang="nl-NL" dirty="0" err="1" smtClean="0">
                 <a:cs typeface="Arial" charset="0"/>
               </a:rPr>
-              <a:t>Kinect.Common</a:t>
+              <a:t>Common</a:t>
             </a:r>
             <a:r>
               <a:rPr lang="nl-NL" dirty="0" smtClean="0">
@@ -1506,7 +1304,7 @@
               <a:rPr lang="nl-NL" dirty="0" err="1" smtClean="0">
                 <a:cs typeface="Arial" charset="0"/>
               </a:rPr>
-              <a:t>Kinect.Service</a:t>
+              <a:t>Kinect.WPF</a:t>
             </a:r>
             <a:r>
               <a:rPr lang="nl-NL" dirty="0" smtClean="0">
@@ -1538,114 +1336,6 @@
               </a:rPr>
               <a:t>]</a:t>
             </a:r>
-          </a:p>
-          <a:p>
-            <a:pPr algn="just">
-              <a:buNone/>
-            </a:pPr>
-            <a:r>
-              <a:rPr lang="nl-NL" dirty="0" smtClean="0">
-                <a:cs typeface="Arial" charset="0"/>
-              </a:rPr>
-              <a:t>[Kinect.UI3]</a:t>
-            </a:r>
-            <a:r>
-              <a:rPr lang="nl-NL" dirty="0" err="1" smtClean="0">
-                <a:cs typeface="Arial" charset="0"/>
-              </a:rPr>
-              <a:t>uses-</a:t>
-            </a:r>
-            <a:r>
-              <a:rPr lang="nl-NL" dirty="0" smtClean="0">
-                <a:cs typeface="Arial" charset="0"/>
-              </a:rPr>
-              <a:t>.-&gt;[</a:t>
-            </a:r>
-            <a:r>
-              <a:rPr lang="nl-NL" dirty="0" err="1" smtClean="0">
-                <a:cs typeface="Arial" charset="0"/>
-              </a:rPr>
-              <a:t>Kinect.Service</a:t>
-            </a:r>
-            <a:r>
-              <a:rPr lang="nl-NL" dirty="0" smtClean="0">
-                <a:cs typeface="Arial" charset="0"/>
-              </a:rPr>
-              <a:t>]</a:t>
-            </a:r>
-          </a:p>
-          <a:p>
-            <a:pPr algn="just">
-              <a:buNone/>
-            </a:pPr>
-            <a:r>
-              <a:rPr lang="nl-NL" dirty="0" smtClean="0">
-                <a:cs typeface="Arial" charset="0"/>
-              </a:rPr>
-              <a:t>[Kinect.UI2]</a:t>
-            </a:r>
-            <a:r>
-              <a:rPr lang="nl-NL" dirty="0" err="1" smtClean="0">
-                <a:cs typeface="Arial" charset="0"/>
-              </a:rPr>
-              <a:t>uses-</a:t>
-            </a:r>
-            <a:r>
-              <a:rPr lang="nl-NL" dirty="0" smtClean="0">
-                <a:cs typeface="Arial" charset="0"/>
-              </a:rPr>
-              <a:t>.-&gt;[</a:t>
-            </a:r>
-            <a:r>
-              <a:rPr lang="nl-NL" dirty="0" err="1" smtClean="0">
-                <a:cs typeface="Arial" charset="0"/>
-              </a:rPr>
-              <a:t>Kinect.Service</a:t>
-            </a:r>
-            <a:r>
-              <a:rPr lang="nl-NL" dirty="0" smtClean="0">
-                <a:cs typeface="Arial" charset="0"/>
-              </a:rPr>
-              <a:t>]</a:t>
-            </a:r>
-          </a:p>
-          <a:p>
-            <a:pPr algn="just">
-              <a:buNone/>
-            </a:pPr>
-            <a:r>
-              <a:rPr lang="nl-NL" dirty="0" smtClean="0">
-                <a:cs typeface="Arial" charset="0"/>
-              </a:rPr>
-              <a:t>[Kinect.UI1]</a:t>
-            </a:r>
-            <a:r>
-              <a:rPr lang="nl-NL" dirty="0" err="1" smtClean="0">
-                <a:cs typeface="Arial" charset="0"/>
-              </a:rPr>
-              <a:t>uses-</a:t>
-            </a:r>
-            <a:r>
-              <a:rPr lang="nl-NL" dirty="0" smtClean="0">
-                <a:cs typeface="Arial" charset="0"/>
-              </a:rPr>
-              <a:t>.-&gt;[</a:t>
-            </a:r>
-            <a:r>
-              <a:rPr lang="nl-NL" dirty="0" err="1" smtClean="0">
-                <a:cs typeface="Arial" charset="0"/>
-              </a:rPr>
-              <a:t>Kinect.Service</a:t>
-            </a:r>
-            <a:r>
-              <a:rPr lang="nl-NL" dirty="0" smtClean="0">
-                <a:cs typeface="Arial" charset="0"/>
-              </a:rPr>
-              <a:t>]</a:t>
-            </a:r>
-            <a:endParaRPr lang="nl-NL" dirty="0" smtClean="0">
-              <a:cs typeface="Arial" charset="0"/>
-            </a:endParaRPr>
           </a:p>
         </p:txBody>
       </p:sp>
@@ -1742,9 +1432,317 @@
             <a:pPr algn="just">
               <a:buNone/>
             </a:pPr>
-            <a:endParaRPr lang="nl-NL" dirty="0">
-              <a:cs typeface="Arial" charset="0"/>
-            </a:endParaRPr>
+            <a:r>
+              <a:rPr lang="nl-NL" dirty="0" smtClean="0">
+                <a:hlinkClick r:id="rId3"/>
+              </a:rPr>
+              <a:t>http://yuml.me/diagram/scruffy;dir:td/class/draw</a:t>
+            </a:r>
+            <a:endParaRPr lang="nl-NL" dirty="0" smtClean="0"/>
+          </a:p>
+          <a:p>
+            <a:pPr algn="just">
+              <a:buNone/>
+            </a:pPr>
+            <a:r>
+              <a:rPr lang="nl-NL" dirty="0" smtClean="0">
+                <a:cs typeface="Arial" charset="0"/>
+              </a:rPr>
+              <a:t># Cool UML Diagram</a:t>
+            </a:r>
+          </a:p>
+          <a:p>
+            <a:pPr algn="just">
+              <a:buNone/>
+            </a:pPr>
+            <a:r>
+              <a:rPr lang="nl-NL" dirty="0" smtClean="0">
+                <a:cs typeface="Arial" charset="0"/>
+              </a:rPr>
+              <a:t>[</a:t>
+            </a:r>
+            <a:r>
+              <a:rPr lang="nl-NL" dirty="0" err="1" smtClean="0">
+                <a:cs typeface="Arial" charset="0"/>
+              </a:rPr>
+              <a:t>Kinect.Core</a:t>
+            </a:r>
+            <a:r>
+              <a:rPr lang="nl-NL" dirty="0" smtClean="0">
+                <a:cs typeface="Arial" charset="0"/>
+              </a:rPr>
+              <a:t>]</a:t>
+            </a:r>
+            <a:r>
+              <a:rPr lang="nl-NL" dirty="0" err="1" smtClean="0">
+                <a:cs typeface="Arial" charset="0"/>
+              </a:rPr>
+              <a:t>uses-</a:t>
+            </a:r>
+            <a:r>
+              <a:rPr lang="nl-NL" dirty="0" smtClean="0">
+                <a:cs typeface="Arial" charset="0"/>
+              </a:rPr>
+              <a:t>.-&gt;[</a:t>
+            </a:r>
+            <a:r>
+              <a:rPr lang="nl-NL" dirty="0" err="1" smtClean="0">
+                <a:cs typeface="Arial" charset="0"/>
+              </a:rPr>
+              <a:t>HiddenMarkovModel</a:t>
+            </a:r>
+            <a:r>
+              <a:rPr lang="nl-NL" dirty="0" smtClean="0">
+                <a:cs typeface="Arial" charset="0"/>
+              </a:rPr>
+              <a:t>]</a:t>
+            </a:r>
+          </a:p>
+          <a:p>
+            <a:pPr algn="just">
+              <a:buNone/>
+            </a:pPr>
+            <a:r>
+              <a:rPr lang="nl-NL" dirty="0" smtClean="0">
+                <a:cs typeface="Arial" charset="0"/>
+              </a:rPr>
+              <a:t>[</a:t>
+            </a:r>
+            <a:r>
+              <a:rPr lang="nl-NL" dirty="0" err="1" smtClean="0">
+                <a:cs typeface="Arial" charset="0"/>
+              </a:rPr>
+              <a:t>Kinect.Core</a:t>
+            </a:r>
+            <a:r>
+              <a:rPr lang="nl-NL" dirty="0" smtClean="0">
+                <a:cs typeface="Arial" charset="0"/>
+              </a:rPr>
+              <a:t>]</a:t>
+            </a:r>
+            <a:r>
+              <a:rPr lang="nl-NL" dirty="0" err="1" smtClean="0">
+                <a:cs typeface="Arial" charset="0"/>
+              </a:rPr>
+              <a:t>uses-</a:t>
+            </a:r>
+            <a:r>
+              <a:rPr lang="nl-NL" dirty="0" smtClean="0">
+                <a:cs typeface="Arial" charset="0"/>
+              </a:rPr>
+              <a:t>.-&gt;[</a:t>
+            </a:r>
+            <a:r>
+              <a:rPr lang="nl-NL" dirty="0" err="1" smtClean="0">
+                <a:cs typeface="Arial" charset="0"/>
+              </a:rPr>
+              <a:t>Kinect.Common</a:t>
+            </a:r>
+            <a:r>
+              <a:rPr lang="nl-NL" dirty="0" smtClean="0">
+                <a:cs typeface="Arial" charset="0"/>
+              </a:rPr>
+              <a:t>]</a:t>
+            </a:r>
+          </a:p>
+          <a:p>
+            <a:pPr algn="just">
+              <a:buNone/>
+            </a:pPr>
+            <a:r>
+              <a:rPr lang="nl-NL" dirty="0" smtClean="0">
+                <a:cs typeface="Arial" charset="0"/>
+              </a:rPr>
+              <a:t>[</a:t>
+            </a:r>
+            <a:r>
+              <a:rPr lang="nl-NL" dirty="0" err="1" smtClean="0">
+                <a:cs typeface="Arial" charset="0"/>
+              </a:rPr>
+              <a:t>Kinect.Service</a:t>
+            </a:r>
+            <a:r>
+              <a:rPr lang="nl-NL" dirty="0" smtClean="0">
+                <a:cs typeface="Arial" charset="0"/>
+              </a:rPr>
+              <a:t>]</a:t>
+            </a:r>
+            <a:r>
+              <a:rPr lang="nl-NL" dirty="0" err="1" smtClean="0">
+                <a:cs typeface="Arial" charset="0"/>
+              </a:rPr>
+              <a:t>uses-</a:t>
+            </a:r>
+            <a:r>
+              <a:rPr lang="nl-NL" dirty="0" smtClean="0">
+                <a:cs typeface="Arial" charset="0"/>
+              </a:rPr>
+              <a:t>.-&gt;[</a:t>
+            </a:r>
+            <a:r>
+              <a:rPr lang="nl-NL" dirty="0" err="1" smtClean="0">
+                <a:cs typeface="Arial" charset="0"/>
+              </a:rPr>
+              <a:t>Kinect.Common</a:t>
+            </a:r>
+            <a:r>
+              <a:rPr lang="nl-NL" dirty="0" smtClean="0">
+                <a:cs typeface="Arial" charset="0"/>
+              </a:rPr>
+              <a:t>]</a:t>
+            </a:r>
+          </a:p>
+          <a:p>
+            <a:pPr algn="just">
+              <a:buNone/>
+            </a:pPr>
+            <a:r>
+              <a:rPr lang="nl-NL" dirty="0" smtClean="0">
+                <a:cs typeface="Arial" charset="0"/>
+              </a:rPr>
+              <a:t>[</a:t>
+            </a:r>
+            <a:r>
+              <a:rPr lang="nl-NL" dirty="0" err="1" smtClean="0">
+                <a:cs typeface="Arial" charset="0"/>
+              </a:rPr>
+              <a:t>Kinect.Service</a:t>
+            </a:r>
+            <a:r>
+              <a:rPr lang="nl-NL" dirty="0" smtClean="0">
+                <a:cs typeface="Arial" charset="0"/>
+              </a:rPr>
+              <a:t>]</a:t>
+            </a:r>
+            <a:r>
+              <a:rPr lang="nl-NL" dirty="0" err="1" smtClean="0">
+                <a:cs typeface="Arial" charset="0"/>
+              </a:rPr>
+              <a:t>uses-</a:t>
+            </a:r>
+            <a:r>
+              <a:rPr lang="nl-NL" dirty="0" smtClean="0">
+                <a:cs typeface="Arial" charset="0"/>
+              </a:rPr>
+              <a:t>.-&gt;[</a:t>
+            </a:r>
+            <a:r>
+              <a:rPr lang="nl-NL" dirty="0" err="1" smtClean="0">
+                <a:cs typeface="Arial" charset="0"/>
+              </a:rPr>
+              <a:t>Kinect.Core</a:t>
+            </a:r>
+            <a:r>
+              <a:rPr lang="nl-NL" dirty="0" smtClean="0">
+                <a:cs typeface="Arial" charset="0"/>
+              </a:rPr>
+              <a:t>]</a:t>
+            </a:r>
+          </a:p>
+          <a:p>
+            <a:pPr algn="just">
+              <a:buNone/>
+            </a:pPr>
+            <a:r>
+              <a:rPr lang="nl-NL" dirty="0" smtClean="0">
+                <a:cs typeface="Arial" charset="0"/>
+              </a:rPr>
+              <a:t>[Kinect.UI3]</a:t>
+            </a:r>
+            <a:r>
+              <a:rPr lang="nl-NL" dirty="0" err="1" smtClean="0">
+                <a:cs typeface="Arial" charset="0"/>
+              </a:rPr>
+              <a:t>uses-</a:t>
+            </a:r>
+            <a:r>
+              <a:rPr lang="nl-NL" dirty="0" smtClean="0">
+                <a:cs typeface="Arial" charset="0"/>
+              </a:rPr>
+              <a:t>.-&gt;[</a:t>
+            </a:r>
+            <a:r>
+              <a:rPr lang="nl-NL" dirty="0" err="1" smtClean="0">
+                <a:cs typeface="Arial" charset="0"/>
+              </a:rPr>
+              <a:t>Kinect.Service</a:t>
+            </a:r>
+            <a:r>
+              <a:rPr lang="nl-NL" dirty="0" smtClean="0">
+                <a:cs typeface="Arial" charset="0"/>
+              </a:rPr>
+              <a:t>]</a:t>
+            </a:r>
+          </a:p>
+          <a:p>
+            <a:pPr algn="just">
+              <a:buNone/>
+            </a:pPr>
+            <a:r>
+              <a:rPr lang="nl-NL" dirty="0" smtClean="0">
+                <a:cs typeface="Arial" charset="0"/>
+              </a:rPr>
+              <a:t>[Kinect.UI2]</a:t>
+            </a:r>
+            <a:r>
+              <a:rPr lang="nl-NL" dirty="0" err="1" smtClean="0">
+                <a:cs typeface="Arial" charset="0"/>
+              </a:rPr>
+              <a:t>uses-</a:t>
+            </a:r>
+            <a:r>
+              <a:rPr lang="nl-NL" dirty="0" smtClean="0">
+                <a:cs typeface="Arial" charset="0"/>
+              </a:rPr>
+              <a:t>.-&gt;[</a:t>
+            </a:r>
+            <a:r>
+              <a:rPr lang="nl-NL" dirty="0" err="1" smtClean="0">
+                <a:cs typeface="Arial" charset="0"/>
+              </a:rPr>
+              <a:t>Kinect.Service</a:t>
+            </a:r>
+            <a:r>
+              <a:rPr lang="nl-NL" dirty="0" smtClean="0">
+                <a:cs typeface="Arial" charset="0"/>
+              </a:rPr>
+              <a:t>]</a:t>
+            </a:r>
+          </a:p>
+          <a:p>
+            <a:pPr algn="just">
+              <a:buNone/>
+            </a:pPr>
+            <a:r>
+              <a:rPr lang="nl-NL" dirty="0" smtClean="0">
+                <a:cs typeface="Arial" charset="0"/>
+              </a:rPr>
+              <a:t>[Kinect.UI1]</a:t>
+            </a:r>
+            <a:r>
+              <a:rPr lang="nl-NL" dirty="0" err="1" smtClean="0">
+                <a:cs typeface="Arial" charset="0"/>
+              </a:rPr>
+              <a:t>uses-</a:t>
+            </a:r>
+            <a:r>
+              <a:rPr lang="nl-NL" dirty="0" smtClean="0">
+                <a:cs typeface="Arial" charset="0"/>
+              </a:rPr>
+              <a:t>.-&gt;[</a:t>
+            </a:r>
+            <a:r>
+              <a:rPr lang="nl-NL" dirty="0" err="1" smtClean="0">
+                <a:cs typeface="Arial" charset="0"/>
+              </a:rPr>
+              <a:t>Kinect.Service</a:t>
+            </a:r>
+            <a:r>
+              <a:rPr lang="nl-NL" dirty="0" smtClean="0">
+                <a:cs typeface="Arial" charset="0"/>
+              </a:rPr>
+              <a:t>]</a:t>
+            </a:r>
           </a:p>
         </p:txBody>
       </p:sp>
@@ -1775,166 +1773,79 @@
       </p:grpSpPr>
       <p:sp>
         <p:nvSpPr>
-          <p:cNvPr id="2" name="Slide Image Placeholder 1"/>
+          <p:cNvPr id="189442" name="Rectangle 1026"/>
           <p:cNvSpPr>
-            <a:spLocks noGrp="1" noRot="1" noChangeAspect="1"/>
+            <a:spLocks noGrp="1" noRot="1" noChangeAspect="1" noChangeArrowheads="1" noTextEdit="1"/>
           </p:cNvSpPr>
           <p:nvPr>
             <p:ph type="sldImg"/>
           </p:nvPr>
         </p:nvSpPr>
-        <p:spPr/>
-      </p:sp>
-      <p:sp>
-        <p:nvSpPr>
-          <p:cNvPr id="3" name="Notes Placeholder 2"/>
+        <p:spPr bwMode="auto">
+          <a:xfrm>
+            <a:off x="922338" y="750888"/>
+            <a:ext cx="4954587" cy="3716337"/>
+          </a:xfrm>
+          <a:prstGeom prst="rect">
+            <a:avLst/>
+          </a:prstGeom>
+          <a:solidFill>
+            <a:srgbClr val="FFFFFF"/>
+          </a:solidFill>
+          <a:ln>
+            <a:solidFill>
+              <a:srgbClr val="000000"/>
+            </a:solidFill>
+            <a:miter lim="800000"/>
+            <a:headEnd/>
+            <a:tailEnd/>
+          </a:ln>
+        </p:spPr>
+      </p:sp>
+      <p:sp>
+        <p:nvSpPr>
+          <p:cNvPr id="189443" name="Rectangle 1027"/>
           <p:cNvSpPr>
-            <a:spLocks noGrp="1"/>
+            <a:spLocks noGrp="1" noChangeArrowheads="1"/>
           </p:cNvSpPr>
           <p:nvPr>
             <p:ph type="body" idx="1"/>
           </p:nvPr>
         </p:nvSpPr>
-        <p:spPr/>
+        <p:spPr bwMode="auto">
+          <a:xfrm>
+            <a:off x="906463" y="4716463"/>
+            <a:ext cx="4984750" cy="4460875"/>
+          </a:xfrm>
+          <a:prstGeom prst="rect">
+            <a:avLst/>
+          </a:prstGeom>
+          <a:solidFill>
+            <a:srgbClr val="FFFFFF"/>
+          </a:solidFill>
+          <a:ln>
+            <a:solidFill>
+              <a:srgbClr val="000000"/>
+            </a:solidFill>
+            <a:miter lim="800000"/>
+            <a:headEnd/>
+            <a:tailEnd/>
+          </a:ln>
+        </p:spPr>
         <p:txBody>
-          <a:bodyPr/>
+          <a:bodyPr lIns="90603" tIns="45301" rIns="90603" bIns="45301"/>
           <a:lstStyle/>
           <a:p>
-            <a:r>
-              <a:rPr lang="nl-NL" dirty="0" smtClean="0"/>
-              <a:t># Cool UML Diagram</a:t>
-            </a:r>
-          </a:p>
-          <a:p>
-            <a:r>
-              <a:rPr lang="nl-NL" dirty="0" smtClean="0"/>
-              <a:t>[</a:t>
-            </a:r>
-            <a:r>
-              <a:rPr lang="nl-NL" dirty="0" err="1" smtClean="0"/>
-              <a:t>IPipeline</a:t>
-            </a:r>
-            <a:r>
-              <a:rPr lang="nl-NL" dirty="0" smtClean="0"/>
-              <a:t>]^-[</a:t>
-            </a:r>
-            <a:r>
-              <a:rPr lang="nl-NL" dirty="0" err="1" smtClean="0"/>
-              <a:t>IFilter</a:t>
-            </a:r>
-            <a:r>
-              <a:rPr lang="nl-NL" dirty="0" smtClean="0"/>
-              <a:t>]</a:t>
-            </a:r>
-          </a:p>
-          <a:p>
-            <a:r>
-              <a:rPr lang="nl-NL" dirty="0" smtClean="0"/>
-              <a:t>[</a:t>
-            </a:r>
-            <a:r>
-              <a:rPr lang="nl-NL" dirty="0" err="1" smtClean="0"/>
-              <a:t>IEventPublisher</a:t>
-            </a:r>
-            <a:r>
-              <a:rPr lang="nl-NL" dirty="0" smtClean="0"/>
-              <a:t>]^-[</a:t>
-            </a:r>
-            <a:r>
-              <a:rPr lang="nl-NL" dirty="0" err="1" smtClean="0"/>
-              <a:t>IFilter</a:t>
-            </a:r>
-            <a:r>
-              <a:rPr lang="nl-NL" dirty="0" smtClean="0"/>
-              <a:t>]</a:t>
-            </a:r>
-          </a:p>
-          <a:p>
-            <a:endParaRPr lang="nl-NL" dirty="0" smtClean="0"/>
-          </a:p>
-          <a:p>
-            <a:r>
-              <a:rPr lang="nl-NL" dirty="0" smtClean="0"/>
-              <a:t># Cool UML Diagram</a:t>
-            </a:r>
-          </a:p>
-          <a:p>
-            <a:r>
-              <a:rPr lang="nl-NL" dirty="0" smtClean="0"/>
-              <a:t>[User : </a:t>
-            </a:r>
-            <a:r>
-              <a:rPr lang="nl-NL" dirty="0" err="1" smtClean="0"/>
-              <a:t>IEventPublisher</a:t>
-            </a:r>
-            <a:r>
-              <a:rPr lang="nl-NL" dirty="0" smtClean="0"/>
-              <a:t>]-&gt;[</a:t>
-            </a:r>
-            <a:r>
-              <a:rPr lang="nl-NL" dirty="0" err="1" smtClean="0"/>
-              <a:t>MyFilter</a:t>
-            </a:r>
-            <a:r>
-              <a:rPr lang="nl-NL" dirty="0" smtClean="0"/>
-              <a:t> : </a:t>
-            </a:r>
-            <a:r>
-              <a:rPr lang="nl-NL" dirty="0" err="1" smtClean="0"/>
-              <a:t>IFilter</a:t>
-            </a:r>
-            <a:r>
-              <a:rPr lang="nl-NL" dirty="0" smtClean="0"/>
-              <a:t>]</a:t>
-            </a:r>
-          </a:p>
-          <a:p>
-            <a:r>
-              <a:rPr lang="nl-NL" dirty="0" smtClean="0"/>
-              <a:t>[</a:t>
-            </a:r>
-            <a:r>
-              <a:rPr lang="nl-NL" dirty="0" err="1" smtClean="0"/>
-              <a:t>MyFilter</a:t>
-            </a:r>
-            <a:r>
-              <a:rPr lang="nl-NL" dirty="0" smtClean="0"/>
-              <a:t> : </a:t>
-            </a:r>
-            <a:r>
-              <a:rPr lang="nl-NL" dirty="0" err="1" smtClean="0"/>
-              <a:t>IFilter</a:t>
-            </a:r>
-            <a:r>
-              <a:rPr lang="nl-NL" dirty="0" smtClean="0"/>
-              <a:t>]-&gt;[</a:t>
-            </a:r>
-            <a:r>
-              <a:rPr lang="nl-NL" dirty="0" err="1" smtClean="0"/>
-              <a:t>MyGesture</a:t>
-            </a:r>
-            <a:r>
-              <a:rPr lang="nl-NL" dirty="0" smtClean="0"/>
-              <a:t> : </a:t>
-            </a:r>
-            <a:r>
-              <a:rPr lang="nl-NL" dirty="0" err="1" smtClean="0"/>
-              <a:t>IPipeline</a:t>
-            </a:r>
-            <a:r>
-              <a:rPr lang="nl-NL" smtClean="0"/>
-              <a:t>]</a:t>
-            </a:r>
-            <a:endParaRPr lang="nl-NL" dirty="0" smtClean="0"/>
+            <a:pPr algn="just">
+              <a:buNone/>
+            </a:pPr>
+            <a:endParaRPr lang="nl-NL" dirty="0">
+              <a:cs typeface="Arial" charset="0"/>
+            </a:endParaRPr>
           </a:p>
         </p:txBody>
       </p:sp>
     </p:spTree>
-    <p:extLst>
-      <p:ext uri="{BB962C8B-B14F-4D97-AF65-F5344CB8AC3E}">
-        <p14:creationId xmlns="" xmlns:p14="http://schemas.microsoft.com/office/powerpoint/2010/main" val="2329958455"/>
-      </p:ext>
-    </p:extLst>
   </p:cSld>
   <p:clrMapOvr>
     <a:masterClrMapping/>
@@ -2042,6 +1953,192 @@
 </file>
 
 <file path=ppt/notesSlides/notesSlide8.xml><?xml version="1.0" encoding="utf-8"?>
+<p:notes xmlns:a="http://schemas.openxmlformats.org/drawingml/2006/main" xmlns:r="http://schemas.openxmlformats.org/officeDocument/2006/relationships" xmlns:p="http://schemas.openxmlformats.org/presentationml/2006/main">
+  <p:cSld>
+    <p:spTree>
+      <p:nvGrpSpPr>
+        <p:cNvPr id="1" name=""/>
+        <p:cNvGrpSpPr/>
+        <p:nvPr/>
+      </p:nvGrpSpPr>
+      <p:grpSpPr>
+        <a:xfrm>
+          <a:off x="0" y="0"/>
+          <a:ext cx="0" cy="0"/>
+          <a:chOff x="0" y="0"/>
+          <a:chExt cx="0" cy="0"/>
+        </a:xfrm>
+      </p:grpSpPr>
+      <p:sp>
+        <p:nvSpPr>
+          <p:cNvPr id="2" name="Slide Image Placeholder 1"/>
+          <p:cNvSpPr>
+            <a:spLocks noGrp="1" noRot="1" noChangeAspect="1"/>
+          </p:cNvSpPr>
+          <p:nvPr>
+            <p:ph type="sldImg"/>
+          </p:nvPr>
+        </p:nvSpPr>
+        <p:spPr/>
+      </p:sp>
+      <p:sp>
+        <p:nvSpPr>
+          <p:cNvPr id="3" name="Notes Placeholder 2"/>
+          <p:cNvSpPr>
+            <a:spLocks noGrp="1"/>
+          </p:cNvSpPr>
+          <p:nvPr>
+            <p:ph type="body" idx="1"/>
+          </p:nvPr>
+        </p:nvSpPr>
+        <p:spPr/>
+        <p:txBody>
+          <a:bodyPr/>
+          <a:lstStyle/>
+          <a:p>
+            <a:r>
+              <a:rPr lang="nl-NL" dirty="0" smtClean="0"/>
+              <a:t># Cool UML Diagram</a:t>
+            </a:r>
+          </a:p>
+          <a:p>
+            <a:r>
+              <a:rPr lang="nl-NL" dirty="0" smtClean="0"/>
+              <a:t>[</a:t>
+            </a:r>
+            <a:r>
+              <a:rPr lang="nl-NL" dirty="0" err="1" smtClean="0"/>
+              <a:t>IPipeline</a:t>
+            </a:r>
+            <a:r>
+              <a:rPr lang="nl-NL" dirty="0" smtClean="0"/>
+              <a:t>]^-[</a:t>
+            </a:r>
+            <a:r>
+              <a:rPr lang="nl-NL" dirty="0" err="1" smtClean="0"/>
+              <a:t>IFilter</a:t>
+            </a:r>
+            <a:r>
+              <a:rPr lang="nl-NL" dirty="0" smtClean="0"/>
+              <a:t>]</a:t>
+            </a:r>
+          </a:p>
+          <a:p>
+            <a:r>
+              <a:rPr lang="nl-NL" dirty="0" smtClean="0"/>
+              <a:t>[</a:t>
+            </a:r>
+            <a:r>
+              <a:rPr lang="nl-NL" dirty="0" err="1" smtClean="0"/>
+              <a:t>IEventPublisher</a:t>
+            </a:r>
+            <a:r>
+              <a:rPr lang="nl-NL" dirty="0" smtClean="0"/>
+              <a:t>]^-[</a:t>
+            </a:r>
+            <a:r>
+              <a:rPr lang="nl-NL" dirty="0" err="1" smtClean="0"/>
+              <a:t>IFilter</a:t>
+            </a:r>
+            <a:r>
+              <a:rPr lang="nl-NL" dirty="0" smtClean="0"/>
+              <a:t>]</a:t>
+            </a:r>
+          </a:p>
+          <a:p>
+            <a:endParaRPr lang="nl-NL" dirty="0" smtClean="0"/>
+          </a:p>
+          <a:p>
+            <a:r>
+              <a:rPr lang="nl-NL" dirty="0" smtClean="0"/>
+              <a:t># Cool UML Diagram</a:t>
+            </a:r>
+          </a:p>
+          <a:p>
+            <a:r>
+              <a:rPr lang="nl-NL" dirty="0" smtClean="0"/>
+              <a:t>[User : </a:t>
+            </a:r>
+            <a:r>
+              <a:rPr lang="nl-NL" dirty="0" err="1" smtClean="0"/>
+              <a:t>IEventPublisher</a:t>
+            </a:r>
+            <a:r>
+              <a:rPr lang="nl-NL" dirty="0" smtClean="0"/>
+              <a:t>]-&gt;[</a:t>
+            </a:r>
+            <a:r>
+              <a:rPr lang="nl-NL" dirty="0" err="1" smtClean="0"/>
+              <a:t>MyFilter</a:t>
+            </a:r>
+            <a:r>
+              <a:rPr lang="nl-NL" dirty="0" smtClean="0"/>
+              <a:t> : </a:t>
+            </a:r>
+            <a:r>
+              <a:rPr lang="nl-NL" dirty="0" err="1" smtClean="0"/>
+              <a:t>IFilter</a:t>
+            </a:r>
+            <a:r>
+              <a:rPr lang="nl-NL" dirty="0" smtClean="0"/>
+              <a:t>]</a:t>
+            </a:r>
+          </a:p>
+          <a:p>
+            <a:r>
+              <a:rPr lang="nl-NL" dirty="0" smtClean="0"/>
+              <a:t>[</a:t>
+            </a:r>
+            <a:r>
+              <a:rPr lang="nl-NL" dirty="0" err="1" smtClean="0"/>
+              <a:t>MyFilter</a:t>
+            </a:r>
+            <a:r>
+              <a:rPr lang="nl-NL" dirty="0" smtClean="0"/>
+              <a:t> : </a:t>
+            </a:r>
+            <a:r>
+              <a:rPr lang="nl-NL" dirty="0" err="1" smtClean="0"/>
+              <a:t>IFilter</a:t>
+            </a:r>
+            <a:r>
+              <a:rPr lang="nl-NL" dirty="0" smtClean="0"/>
+              <a:t>]-&gt;[</a:t>
+            </a:r>
+            <a:r>
+              <a:rPr lang="nl-NL" dirty="0" err="1" smtClean="0"/>
+              <a:t>MyGesture</a:t>
+            </a:r>
+            <a:r>
+              <a:rPr lang="nl-NL" dirty="0" smtClean="0"/>
+              <a:t> : </a:t>
+            </a:r>
+            <a:r>
+              <a:rPr lang="nl-NL" dirty="0" err="1" smtClean="0"/>
+              <a:t>IPipeline</a:t>
+            </a:r>
+            <a:r>
+              <a:rPr lang="nl-NL" smtClean="0"/>
+              <a:t>]</a:t>
+            </a:r>
+            <a:endParaRPr lang="nl-NL" dirty="0" smtClean="0"/>
+          </a:p>
+        </p:txBody>
+      </p:sp>
+    </p:spTree>
+    <p:extLst>
+      <p:ext uri="{BB962C8B-B14F-4D97-AF65-F5344CB8AC3E}">
+        <p14:creationId xmlns:p14="http://schemas.microsoft.com/office/powerpoint/2010/main" xmlns="" val="2329958455"/>
+      </p:ext>
+    </p:extLst>
+  </p:cSld>
+  <p:clrMapOvr>
+    <a:masterClrMapping/>
+  </p:clrMapOvr>
+</p:notes>
+</file>
+
+<file path=ppt/notesSlides/notesSlide9.xml><?xml version="1.0" encoding="utf-8"?>
 <p:notes xmlns:a="http://schemas.openxmlformats.org/drawingml/2006/main" xmlns:r="http://schemas.openxmlformats.org/officeDocument/2006/relationships" xmlns:p="http://schemas.openxmlformats.org/presentationml/2006/main">
   <p:cSld>
     <p:spTree>
@@ -4631,23 +4728,7 @@
                   <a:srgbClr val="86888B"/>
                 </a:solidFill>
               </a:rPr>
-              <a:t>Eindhoven, 9 </a:t>
-            </a:r>
-            <a:r>
-              <a:rPr lang="en-US" sz="1600" i="1" dirty="0" err="1" smtClean="0">
-                <a:solidFill>
-                  <a:srgbClr val="86888B"/>
-                </a:solidFill>
-              </a:rPr>
-              <a:t>juni</a:t>
-            </a:r>
-            <a:r>
-              <a:rPr lang="en-US" sz="1600" i="1" dirty="0" smtClean="0">
-                <a:solidFill>
-                  <a:srgbClr val="86888B"/>
-                </a:solidFill>
-              </a:rPr>
-              <a:t> 2011</a:t>
+              <a:t>Arnhem, 5 July 2011</a:t>
             </a:r>
             <a:endParaRPr lang="en-US" sz="1600" i="1" dirty="0">
               <a:solidFill>
@@ -4862,11 +4943,25 @@
           <a:p>
             <a:r>
               <a:rPr lang="nl-NL" dirty="0" err="1" smtClean="0"/>
+              <a:t>What</a:t>
+            </a:r>
+            <a:r>
+              <a:rPr lang="nl-NL" dirty="0" smtClean="0"/>
+              <a:t> is Kinect?</a:t>
+            </a:r>
+          </a:p>
+          <a:p>
+            <a:r>
+              <a:rPr lang="nl-NL" dirty="0" err="1" smtClean="0"/>
               <a:t>Architecture</a:t>
             </a:r>
             <a:r>
               <a:rPr lang="nl-NL" dirty="0" smtClean="0"/>
-              <a:t> / </a:t>
+              <a:t> </a:t>
+            </a:r>
+            <a:r>
+              <a:rPr lang="nl-NL" dirty="0" smtClean="0"/>
+              <a:t>/ </a:t>
             </a:r>
             <a:r>
               <a:rPr lang="nl-NL" dirty="0" err="1" smtClean="0"/>
@@ -4943,6 +5038,32 @@
           <a:chExt cx="0" cy="0"/>
         </a:xfrm>
       </p:grpSpPr>
+      <p:pic>
+        <p:nvPicPr>
+          <p:cNvPr id="6" name="Picture 1060" descr="http://media.insidegamer.nl/dump/1284639147.jpg"/>
+          <p:cNvPicPr>
+            <a:picLocks noChangeAspect="1" noChangeArrowheads="1"/>
+          </p:cNvPicPr>
+          <p:nvPr/>
+        </p:nvPicPr>
+        <p:blipFill>
+          <a:blip r:embed="rId3" cstate="print"/>
+          <a:srcRect/>
+          <a:stretch>
+            <a:fillRect/>
+          </a:stretch>
+        </p:blipFill>
+        <p:spPr bwMode="auto">
+          <a:xfrm>
+            <a:off x="1497489" y="2599765"/>
+            <a:ext cx="7389608" cy="3694804"/>
+          </a:xfrm>
+          <a:prstGeom prst="rect">
+            <a:avLst/>
+          </a:prstGeom>
+          <a:noFill/>
+        </p:spPr>
+      </p:pic>
       <p:sp>
         <p:nvSpPr>
           <p:cNvPr id="226316" name="Rectangle 2060"/>
@@ -4959,8 +5080,8 @@
           <a:lstStyle/>
           <a:p>
             <a:r>
-              <a:rPr lang="en-US" smtClean="0"/>
-              <a:t>Architecture</a:t>
+              <a:rPr lang="en-US" dirty="0" smtClean="0"/>
+              <a:t>What is Kinect?</a:t>
             </a:r>
             <a:endParaRPr lang="en-US" dirty="0"/>
           </a:p>
@@ -4997,20 +5118,212 @@
           <a:p>
             <a:pPr algn="l"/>
             <a:r>
+              <a:rPr lang="en-US" b="1" dirty="0" err="1" smtClean="0">
+                <a:solidFill>
+                  <a:srgbClr val="86888B"/>
+                </a:solidFill>
+              </a:rPr>
+              <a:t>Introducuction</a:t>
+            </a:r>
+            <a:endParaRPr lang="en-US" b="1" dirty="0">
+              <a:solidFill>
+                <a:srgbClr val="86888B"/>
+              </a:solidFill>
+            </a:endParaRPr>
+          </a:p>
+        </p:txBody>
+      </p:sp>
+      <p:sp>
+        <p:nvSpPr>
+          <p:cNvPr id="226322" name="Rectangle 2066"/>
+          <p:cNvSpPr>
+            <a:spLocks noChangeArrowheads="1"/>
+          </p:cNvSpPr>
+          <p:nvPr/>
+        </p:nvSpPr>
+        <p:spPr bwMode="auto">
+          <a:xfrm>
+            <a:off x="188913" y="6254750"/>
+            <a:ext cx="8764587" cy="274638"/>
+          </a:xfrm>
+          <a:prstGeom prst="rect">
+            <a:avLst/>
+          </a:prstGeom>
+          <a:noFill/>
+          <a:ln w="9525">
+            <a:noFill/>
+            <a:miter lim="800000"/>
+            <a:headEnd/>
+            <a:tailEnd/>
+          </a:ln>
+          <a:effectLst/>
+        </p:spPr>
+        <p:txBody>
+          <a:bodyPr lIns="0" tIns="0" rIns="0" bIns="0" anchor="b"/>
+          <a:lstStyle/>
+          <a:p>
+            <a:pPr algn="r" eaLnBrk="0" hangingPunct="0">
+              <a:buClrTx/>
+              <a:buFontTx/>
+              <a:buNone/>
+            </a:pPr>
+            <a:endParaRPr lang="en-US" dirty="0">
+              <a:solidFill>
+                <a:schemeClr val="tx2"/>
+              </a:solidFill>
+            </a:endParaRPr>
+          </a:p>
+        </p:txBody>
+      </p:sp>
+      <p:sp>
+        <p:nvSpPr>
+          <p:cNvPr id="7" name="Tijdelijke aanduiding voor inhoud 6"/>
+          <p:cNvSpPr>
+            <a:spLocks noGrp="1"/>
+          </p:cNvSpPr>
+          <p:nvPr>
+            <p:ph idx="1"/>
+          </p:nvPr>
+        </p:nvSpPr>
+        <p:spPr/>
+        <p:txBody>
+          <a:bodyPr/>
+          <a:lstStyle/>
+          <a:p>
+            <a:r>
+              <a:rPr lang="nl-NL" dirty="0" smtClean="0"/>
+              <a:t>Camera</a:t>
+            </a:r>
+          </a:p>
+          <a:p>
+            <a:r>
+              <a:rPr lang="nl-NL" dirty="0" err="1" smtClean="0"/>
+              <a:t>Can</a:t>
+            </a:r>
+            <a:r>
+              <a:rPr lang="nl-NL" dirty="0" smtClean="0"/>
+              <a:t> track a </a:t>
+            </a:r>
+            <a:r>
+              <a:rPr lang="nl-NL" dirty="0" err="1" smtClean="0"/>
+              <a:t>users</a:t>
+            </a:r>
+            <a:r>
+              <a:rPr lang="nl-NL" dirty="0" smtClean="0"/>
+              <a:t> body</a:t>
+            </a:r>
+            <a:endParaRPr lang="nl-NL" dirty="0" smtClean="0"/>
+          </a:p>
+          <a:p>
+            <a:r>
+              <a:rPr lang="nl-NL" dirty="0" err="1" smtClean="0"/>
+              <a:t>Can</a:t>
+            </a:r>
+            <a:r>
+              <a:rPr lang="nl-NL" dirty="0" smtClean="0"/>
+              <a:t> </a:t>
+            </a:r>
+            <a:r>
+              <a:rPr lang="nl-NL" dirty="0" err="1" smtClean="0"/>
+              <a:t>see</a:t>
+            </a:r>
+            <a:r>
+              <a:rPr lang="nl-NL" dirty="0" smtClean="0"/>
+              <a:t> </a:t>
+            </a:r>
+            <a:r>
+              <a:rPr lang="nl-NL" dirty="0" err="1" smtClean="0"/>
+              <a:t>depth</a:t>
+            </a:r>
+            <a:endParaRPr lang="nl-NL" dirty="0"/>
+          </a:p>
+        </p:txBody>
+      </p:sp>
+    </p:spTree>
+  </p:cSld>
+  <p:clrMapOvr>
+    <a:masterClrMapping/>
+  </p:clrMapOvr>
+</p:sld>
+</file>
+
+<file path=ppt/slides/slide4.xml><?xml version="1.0" encoding="utf-8"?>
+<p:sld xmlns:a="http://schemas.openxmlformats.org/drawingml/2006/main" xmlns:r="http://schemas.openxmlformats.org/officeDocument/2006/relationships" xmlns:p="http://schemas.openxmlformats.org/presentationml/2006/main">
+  <p:cSld>
+    <p:spTree>
+      <p:nvGrpSpPr>
+        <p:cNvPr id="1" name=""/>
+        <p:cNvGrpSpPr/>
+        <p:nvPr/>
+      </p:nvGrpSpPr>
+      <p:grpSpPr>
+        <a:xfrm>
+          <a:off x="0" y="0"/>
+          <a:ext cx="0" cy="0"/>
+          <a:chOff x="0" y="0"/>
+          <a:chExt cx="0" cy="0"/>
+        </a:xfrm>
+      </p:grpSpPr>
+      <p:sp>
+        <p:nvSpPr>
+          <p:cNvPr id="226316" name="Rectangle 2060"/>
+          <p:cNvSpPr>
+            <a:spLocks noGrp="1" noChangeArrowheads="1"/>
+          </p:cNvSpPr>
+          <p:nvPr>
+            <p:ph type="title"/>
+          </p:nvPr>
+        </p:nvSpPr>
+        <p:spPr/>
+        <p:txBody>
+          <a:bodyPr/>
+          <a:lstStyle/>
+          <a:p>
+            <a:r>
+              <a:rPr lang="en-US" smtClean="0"/>
+              <a:t>Architecture</a:t>
+            </a:r>
+            <a:endParaRPr lang="en-US" dirty="0"/>
+          </a:p>
+        </p:txBody>
+      </p:sp>
+      <p:sp>
+        <p:nvSpPr>
+          <p:cNvPr id="226319" name="Rectangle 2063"/>
+          <p:cNvSpPr>
+            <a:spLocks noChangeArrowheads="1"/>
+          </p:cNvSpPr>
+          <p:nvPr/>
+        </p:nvSpPr>
+        <p:spPr bwMode="auto">
+          <a:xfrm>
+            <a:off x="188913" y="1022350"/>
+            <a:ext cx="6710362" cy="273050"/>
+          </a:xfrm>
+          <a:prstGeom prst="rect">
+            <a:avLst/>
+          </a:prstGeom>
+          <a:noFill/>
+          <a:ln w="6350">
+            <a:noFill/>
+            <a:miter lim="800000"/>
+            <a:headEnd/>
+            <a:tailEnd/>
+          </a:ln>
+          <a:effectLst/>
+        </p:spPr>
+        <p:txBody>
+          <a:bodyPr lIns="0" tIns="0" rIns="0" bIns="0"/>
+          <a:lstStyle/>
+          <a:p>
+            <a:pPr algn="l"/>
+            <a:r>
               <a:rPr lang="en-US" b="1" dirty="0" smtClean="0">
                 <a:solidFill>
                   <a:srgbClr val="86888B"/>
                 </a:solidFill>
               </a:rPr>
-              <a:t>Cohesion of the visual studio </a:t>
-            </a:r>
-            <a:r>
-              <a:rPr lang="en-US" b="1" dirty="0" smtClean="0">
-                <a:solidFill>
-                  <a:srgbClr val="86888B"/>
-                </a:solidFill>
-              </a:rPr>
-              <a:t>projects</a:t>
+              <a:t>Cohesion of the visual studio projects</a:t>
             </a:r>
             <a:endParaRPr lang="en-US" b="1" dirty="0">
               <a:solidFill>
@@ -5232,16 +5545,6 @@
               </a:rPr>
               <a:t>Framework</a:t>
             </a:r>
-            <a:endParaRPr kumimoji="0" lang="nl-NL" sz="1800" b="1" i="0" u="none" strike="noStrike" cap="none" normalizeH="0" baseline="0" dirty="0" smtClean="0">
-              <a:ln>
-                <a:noFill/>
-              </a:ln>
-              <a:solidFill>
-                <a:schemeClr val="bg1"/>
-              </a:solidFill>
-              <a:effectLst/>
-              <a:latin typeface="Arial" charset="0"/>
-            </a:endParaRPr>
           </a:p>
         </p:txBody>
       </p:sp>
@@ -5493,7 +5796,7 @@
 </p:sld>
 </file>
 
-<file path=ppt/slides/slide4.xml><?xml version="1.0" encoding="utf-8"?>
+<file path=ppt/slides/slide5.xml><?xml version="1.0" encoding="utf-8"?>
 <p:sld xmlns:a="http://schemas.openxmlformats.org/drawingml/2006/main" xmlns:r="http://schemas.openxmlformats.org/officeDocument/2006/relationships" xmlns:p="http://schemas.openxmlformats.org/presentationml/2006/main">
   <p:cSld>
     <p:spTree>
@@ -5569,15 +5872,7 @@
                   <a:srgbClr val="86888B"/>
                 </a:solidFill>
               </a:rPr>
-              <a:t>Cohesion of the visual studio </a:t>
-            </a:r>
-            <a:r>
-              <a:rPr lang="en-US" b="1" dirty="0" smtClean="0">
-                <a:solidFill>
-                  <a:srgbClr val="86888B"/>
-                </a:solidFill>
-              </a:rPr>
-              <a:t>projects</a:t>
+              <a:t>Cohesion of the visual studio projects</a:t>
             </a:r>
             <a:endParaRPr lang="en-US" b="1" dirty="0">
               <a:solidFill>
@@ -5799,16 +6094,6 @@
               </a:rPr>
               <a:t>Framework</a:t>
             </a:r>
-            <a:endParaRPr kumimoji="0" lang="nl-NL" sz="1800" b="1" i="0" u="none" strike="noStrike" cap="none" normalizeH="0" baseline="0" dirty="0" smtClean="0">
-              <a:ln>
-                <a:noFill/>
-              </a:ln>
-              <a:solidFill>
-                <a:schemeClr val="bg1"/>
-              </a:solidFill>
-              <a:effectLst/>
-              <a:latin typeface="Arial" charset="0"/>
-            </a:endParaRPr>
           </a:p>
         </p:txBody>
       </p:sp>
@@ -6060,7 +6345,7 @@
 </p:sld>
 </file>
 
-<file path=ppt/slides/slide5.xml><?xml version="1.0" encoding="utf-8"?>
+<file path=ppt/slides/slide6.xml><?xml version="1.0" encoding="utf-8"?>
 <p:sld xmlns:a="http://schemas.openxmlformats.org/drawingml/2006/main" xmlns:r="http://schemas.openxmlformats.org/officeDocument/2006/relationships" xmlns:p="http://schemas.openxmlformats.org/presentationml/2006/main">
   <p:cSld>
     <p:spTree>
@@ -6094,7 +6379,7 @@
           <a:p>
             <a:r>
               <a:rPr lang="en-US" dirty="0" smtClean="0"/>
-              <a:t>Stuff to think about</a:t>
+              <a:t>Tips for the workshop</a:t>
             </a:r>
             <a:endParaRPr lang="en-US" dirty="0"/>
           </a:p>
@@ -6261,12 +6546,24 @@
           <a:p>
             <a:pPr lvl="1"/>
             <a:r>
+              <a:rPr lang="nl-NL" dirty="0" err="1" smtClean="0"/>
+              <a:t>UpdateUserInterface</a:t>
+            </a:r>
+            <a:r>
               <a:rPr lang="nl-NL" dirty="0" smtClean="0"/>
-              <a:t>Updating User Interface</a:t>
-            </a:r>
-          </a:p>
-          <a:p>
-            <a:pPr lvl="1"/>
+              <a:t>(() =&gt; Stuff </a:t>
+            </a:r>
+            <a:r>
+              <a:rPr lang="nl-NL" dirty="0" err="1" smtClean="0"/>
+              <a:t>you</a:t>
+            </a:r>
+            <a:r>
+              <a:rPr lang="nl-NL" dirty="0" smtClean="0"/>
+              <a:t> want to do);</a:t>
+            </a:r>
+            <a:endParaRPr lang="nl-NL" dirty="0" smtClean="0"/>
+          </a:p>
+          <a:p>
             <a:r>
               <a:rPr lang="nl-NL" dirty="0" err="1" smtClean="0"/>
               <a:t>Debugging</a:t>
@@ -6281,8 +6578,40 @@
             </a:r>
             <a:r>
               <a:rPr lang="nl-NL" dirty="0" smtClean="0"/>
-              <a:t> code</a:t>
-            </a:r>
+              <a:t> </a:t>
+            </a:r>
+            <a:r>
+              <a:rPr lang="nl-NL" dirty="0" smtClean="0"/>
+              <a:t>code</a:t>
+            </a:r>
+          </a:p>
+          <a:p>
+            <a:pPr lvl="1"/>
+            <a:r>
+              <a:rPr lang="nl-NL" dirty="0" smtClean="0"/>
+              <a:t>Log as </a:t>
+            </a:r>
+            <a:r>
+              <a:rPr lang="nl-NL" dirty="0" err="1" smtClean="0"/>
+              <a:t>much</a:t>
+            </a:r>
+            <a:r>
+              <a:rPr lang="nl-NL" dirty="0" smtClean="0"/>
+              <a:t> as </a:t>
+            </a:r>
+            <a:r>
+              <a:rPr lang="nl-NL" dirty="0" err="1" smtClean="0"/>
+              <a:t>possible</a:t>
+            </a:r>
+            <a:r>
+              <a:rPr lang="nl-NL" dirty="0" smtClean="0"/>
+              <a:t> to the </a:t>
+            </a:r>
+            <a:r>
+              <a:rPr lang="nl-NL" dirty="0" err="1" smtClean="0"/>
+              <a:t>Messages</a:t>
+            </a:r>
+            <a:endParaRPr lang="nl-NL" dirty="0" smtClean="0"/>
           </a:p>
           <a:p>
             <a:r>
@@ -6303,241 +6632,43 @@
             <a:endParaRPr lang="nl-NL" dirty="0" smtClean="0"/>
           </a:p>
           <a:p>
+            <a:pPr lvl="1"/>
+            <a:r>
+              <a:rPr lang="nl-NL" dirty="0" err="1" smtClean="0"/>
+              <a:t>Solution</a:t>
+            </a:r>
+            <a:r>
+              <a:rPr lang="nl-NL" dirty="0" smtClean="0"/>
+              <a:t> we </a:t>
+            </a:r>
+            <a:r>
+              <a:rPr lang="nl-NL" dirty="0" err="1" smtClean="0"/>
+              <a:t>make</a:t>
+            </a:r>
+            <a:r>
+              <a:rPr lang="nl-NL" dirty="0" smtClean="0"/>
+              <a:t> in the </a:t>
+            </a:r>
+            <a:r>
+              <a:rPr lang="nl-NL" dirty="0" err="1" smtClean="0"/>
+              <a:t>Gesture</a:t>
+            </a:r>
+            <a:r>
+              <a:rPr lang="nl-NL" dirty="0" smtClean="0"/>
+              <a:t> Filter part of the workshop</a:t>
+            </a:r>
             <a:endParaRPr lang="nl-NL" dirty="0" smtClean="0"/>
           </a:p>
+          <a:p>
+            <a:pPr lvl="1"/>
+            <a:endParaRPr lang="nl-NL" dirty="0" smtClean="0"/>
+          </a:p>
+          <a:p>
+            <a:endParaRPr lang="nl-NL" dirty="0" smtClean="0"/>
+          </a:p>
         </p:txBody>
       </p:sp>
     </p:spTree>
-  </p:cSld>
-  <p:clrMapOvr>
-    <a:masterClrMapping/>
-  </p:clrMapOvr>
-  <p:timing>
-    <p:tnLst>
-      <p:par>
-        <p:cTn id="1" dur="indefinite" restart="never" nodeType="tmRoot"/>
-      </p:par>
-    </p:tnLst>
-  </p:timing>
-</p:sld>
-</file>
-
-<file path=ppt/slides/slide6.xml><?xml version="1.0" encoding="utf-8"?>
-<p:sld xmlns:a="http://schemas.openxmlformats.org/drawingml/2006/main" xmlns:r="http://schemas.openxmlformats.org/officeDocument/2006/relationships" xmlns:p="http://schemas.openxmlformats.org/presentationml/2006/main">
-  <p:cSld>
-    <p:spTree>
-      <p:nvGrpSpPr>
-        <p:cNvPr id="1" name=""/>
-        <p:cNvGrpSpPr/>
-        <p:nvPr/>
-      </p:nvGrpSpPr>
-      <p:grpSpPr>
-        <a:xfrm>
-          <a:off x="0" y="0"/>
-          <a:ext cx="0" cy="0"/>
-          <a:chOff x="0" y="0"/>
-          <a:chExt cx="0" cy="0"/>
-        </a:xfrm>
-      </p:grpSpPr>
-      <p:sp>
-        <p:nvSpPr>
-          <p:cNvPr id="2" name="Title 1"/>
-          <p:cNvSpPr>
-            <a:spLocks noGrp="1"/>
-          </p:cNvSpPr>
-          <p:nvPr>
-            <p:ph type="title"/>
-          </p:nvPr>
-        </p:nvSpPr>
-        <p:spPr/>
-        <p:txBody>
-          <a:bodyPr/>
-          <a:lstStyle/>
-          <a:p>
-            <a:r>
-              <a:rPr lang="nl-NL" dirty="0" smtClean="0"/>
-              <a:t>Filters </a:t>
-            </a:r>
-            <a:r>
-              <a:rPr lang="nl-NL" dirty="0" err="1" smtClean="0"/>
-              <a:t>and</a:t>
-            </a:r>
-            <a:r>
-              <a:rPr lang="nl-NL" dirty="0" smtClean="0"/>
-              <a:t> </a:t>
-            </a:r>
-            <a:r>
-              <a:rPr lang="nl-NL" dirty="0" err="1" smtClean="0"/>
-              <a:t>Gestures</a:t>
-            </a:r>
-            <a:endParaRPr lang="nl-NL" dirty="0"/>
-          </a:p>
-        </p:txBody>
-      </p:sp>
-      <p:sp>
-        <p:nvSpPr>
-          <p:cNvPr id="4" name="TextBox 3"/>
-          <p:cNvSpPr txBox="1"/>
-          <p:nvPr/>
-        </p:nvSpPr>
-        <p:spPr>
-          <a:xfrm>
-            <a:off x="476466" y="1488954"/>
-            <a:ext cx="1197765" cy="369332"/>
-          </a:xfrm>
-          <a:prstGeom prst="rect">
-            <a:avLst/>
-          </a:prstGeom>
-          <a:noFill/>
-        </p:spPr>
-        <p:txBody>
-          <a:bodyPr wrap="none" rtlCol="0">
-            <a:spAutoFit/>
-          </a:bodyPr>
-          <a:lstStyle/>
-          <a:p>
-            <a:r>
-              <a:rPr lang="nl-NL" dirty="0" smtClean="0">
-                <a:solidFill>
-                  <a:schemeClr val="tx1"/>
-                </a:solidFill>
-              </a:rPr>
-              <a:t>Interfaces</a:t>
-            </a:r>
-            <a:endParaRPr lang="nl-NL" dirty="0">
-              <a:solidFill>
-                <a:schemeClr val="tx1"/>
-              </a:solidFill>
-            </a:endParaRPr>
-          </a:p>
-        </p:txBody>
-      </p:sp>
-      <p:pic>
-        <p:nvPicPr>
-          <p:cNvPr id="1027" name="Picture 3" descr="C:\Users\A134263\Documents\Microsoft Community\Kinect Workshop\Interfaces.png"/>
-          <p:cNvPicPr>
-            <a:picLocks noChangeAspect="1" noChangeArrowheads="1"/>
-          </p:cNvPicPr>
-          <p:nvPr/>
-        </p:nvPicPr>
-        <p:blipFill>
-          <a:blip r:embed="rId3" cstate="print">
-            <a:extLst>
-              <a:ext uri="{28A0092B-C50C-407E-A947-70E740481C1C}">
-                <a14:useLocalDpi xmlns="" xmlns:a14="http://schemas.microsoft.com/office/drawing/2010/main" val="0"/>
-              </a:ext>
-            </a:extLst>
-          </a:blip>
-          <a:srcRect/>
-          <a:stretch>
-            <a:fillRect/>
-          </a:stretch>
-        </p:blipFill>
-        <p:spPr bwMode="auto">
-          <a:xfrm>
-            <a:off x="476466" y="2018690"/>
-            <a:ext cx="3152775" cy="2409825"/>
-          </a:xfrm>
-          <a:prstGeom prst="rect">
-            <a:avLst/>
-          </a:prstGeom>
-          <a:noFill/>
-          <a:extLst>
-            <a:ext uri="{909E8E84-426E-40DD-AFC4-6F175D3DCCD1}">
-              <a14:hiddenFill xmlns="" xmlns:a14="http://schemas.microsoft.com/office/drawing/2010/main">
-                <a:solidFill>
-                  <a:srgbClr val="FFFFFF"/>
-                </a:solidFill>
-              </a14:hiddenFill>
-            </a:ext>
-          </a:extLst>
-        </p:spPr>
-      </p:pic>
-      <p:sp>
-        <p:nvSpPr>
-          <p:cNvPr id="8" name="TextBox 7"/>
-          <p:cNvSpPr txBox="1"/>
-          <p:nvPr/>
-        </p:nvSpPr>
-        <p:spPr>
-          <a:xfrm>
-            <a:off x="476466" y="5104644"/>
-            <a:ext cx="1120821" cy="369332"/>
-          </a:xfrm>
-          <a:prstGeom prst="rect">
-            <a:avLst/>
-          </a:prstGeom>
-          <a:noFill/>
-        </p:spPr>
-        <p:txBody>
-          <a:bodyPr wrap="none" rtlCol="0">
-            <a:spAutoFit/>
-          </a:bodyPr>
-          <a:lstStyle/>
-          <a:p>
-            <a:r>
-              <a:rPr lang="nl-NL" dirty="0" smtClean="0">
-                <a:solidFill>
-                  <a:schemeClr val="tx1"/>
-                </a:solidFill>
-              </a:rPr>
-              <a:t>Pipelines</a:t>
-            </a:r>
-            <a:endParaRPr lang="nl-NL" dirty="0">
-              <a:solidFill>
-                <a:schemeClr val="tx1"/>
-              </a:solidFill>
-            </a:endParaRPr>
-          </a:p>
-        </p:txBody>
-      </p:sp>
-      <p:pic>
-        <p:nvPicPr>
-          <p:cNvPr id="1029" name="Picture 5" descr="C:\Users\A134263\Documents\Microsoft Community\Kinect Workshop\Pipeline.png"/>
-          <p:cNvPicPr>
-            <a:picLocks noChangeAspect="1" noChangeArrowheads="1"/>
-          </p:cNvPicPr>
-          <p:nvPr/>
-        </p:nvPicPr>
-        <p:blipFill>
-          <a:blip r:embed="rId4" cstate="print">
-            <a:extLst>
-              <a:ext uri="{28A0092B-C50C-407E-A947-70E740481C1C}">
-                <a14:useLocalDpi xmlns="" xmlns:a14="http://schemas.microsoft.com/office/drawing/2010/main" val="0"/>
-              </a:ext>
-            </a:extLst>
-          </a:blip>
-          <a:srcRect/>
-          <a:stretch>
-            <a:fillRect/>
-          </a:stretch>
-        </p:blipFill>
-        <p:spPr bwMode="auto">
-          <a:xfrm>
-            <a:off x="476466" y="5473976"/>
-            <a:ext cx="7208838" cy="885825"/>
-          </a:xfrm>
-          <a:prstGeom prst="rect">
-            <a:avLst/>
-          </a:prstGeom>
-          <a:noFill/>
-          <a:extLst>
-            <a:ext uri="{909E8E84-426E-40DD-AFC4-6F175D3DCCD1}">
-              <a14:hiddenFill xmlns="" xmlns:a14="http://schemas.microsoft.com/office/drawing/2010/main">
-                <a:solidFill>
-                  <a:srgbClr val="FFFFFF"/>
-                </a:solidFill>
-              </a14:hiddenFill>
-            </a:ext>
-          </a:extLst>
-        </p:spPr>
-      </p:pic>
-    </p:spTree>
-    <p:extLst>
-      <p:ext uri="{BB962C8B-B14F-4D97-AF65-F5344CB8AC3E}">
-        <p14:creationId xmlns="" xmlns:p14="http://schemas.microsoft.com/office/powerpoint/2010/main" val="630321771"/>
-      </p:ext>
-    </p:extLst>
   </p:cSld>
   <p:clrMapOvr>
     <a:masterClrMapping/>
@@ -6845,6 +6976,423 @@
 </file>
 
 <file path=ppt/slides/slide8.xml><?xml version="1.0" encoding="utf-8"?>
+<p:sld xmlns:a="http://schemas.openxmlformats.org/drawingml/2006/main" xmlns:r="http://schemas.openxmlformats.org/officeDocument/2006/relationships" xmlns:p="http://schemas.openxmlformats.org/presentationml/2006/main">
+  <p:cSld>
+    <p:spTree>
+      <p:nvGrpSpPr>
+        <p:cNvPr id="1" name=""/>
+        <p:cNvGrpSpPr/>
+        <p:nvPr/>
+      </p:nvGrpSpPr>
+      <p:grpSpPr>
+        <a:xfrm>
+          <a:off x="0" y="0"/>
+          <a:ext cx="0" cy="0"/>
+          <a:chOff x="0" y="0"/>
+          <a:chExt cx="0" cy="0"/>
+        </a:xfrm>
+      </p:grpSpPr>
+      <p:sp>
+        <p:nvSpPr>
+          <p:cNvPr id="2" name="Title 1"/>
+          <p:cNvSpPr>
+            <a:spLocks noGrp="1"/>
+          </p:cNvSpPr>
+          <p:nvPr>
+            <p:ph type="title"/>
+          </p:nvPr>
+        </p:nvSpPr>
+        <p:spPr/>
+        <p:txBody>
+          <a:bodyPr/>
+          <a:lstStyle/>
+          <a:p>
+            <a:r>
+              <a:rPr lang="nl-NL" dirty="0" smtClean="0"/>
+              <a:t>Filters </a:t>
+            </a:r>
+            <a:r>
+              <a:rPr lang="nl-NL" dirty="0" err="1" smtClean="0"/>
+              <a:t>and</a:t>
+            </a:r>
+            <a:r>
+              <a:rPr lang="nl-NL" dirty="0" smtClean="0"/>
+              <a:t> </a:t>
+            </a:r>
+            <a:r>
+              <a:rPr lang="nl-NL" dirty="0" err="1" smtClean="0"/>
+              <a:t>Gestures</a:t>
+            </a:r>
+            <a:endParaRPr lang="nl-NL" dirty="0"/>
+          </a:p>
+        </p:txBody>
+      </p:sp>
+      <p:sp>
+        <p:nvSpPr>
+          <p:cNvPr id="4" name="TextBox 3"/>
+          <p:cNvSpPr txBox="1"/>
+          <p:nvPr/>
+        </p:nvSpPr>
+        <p:spPr>
+          <a:xfrm>
+            <a:off x="476466" y="1488954"/>
+            <a:ext cx="1197765" cy="369332"/>
+          </a:xfrm>
+          <a:prstGeom prst="rect">
+            <a:avLst/>
+          </a:prstGeom>
+          <a:noFill/>
+        </p:spPr>
+        <p:txBody>
+          <a:bodyPr wrap="none" rtlCol="0">
+            <a:spAutoFit/>
+          </a:bodyPr>
+          <a:lstStyle/>
+          <a:p>
+            <a:r>
+              <a:rPr lang="nl-NL" dirty="0" smtClean="0">
+                <a:solidFill>
+                  <a:schemeClr val="tx1"/>
+                </a:solidFill>
+              </a:rPr>
+              <a:t>Interfaces</a:t>
+            </a:r>
+            <a:endParaRPr lang="nl-NL" dirty="0">
+              <a:solidFill>
+                <a:schemeClr val="tx1"/>
+              </a:solidFill>
+            </a:endParaRPr>
+          </a:p>
+        </p:txBody>
+      </p:sp>
+      <p:pic>
+        <p:nvPicPr>
+          <p:cNvPr id="1027" name="Picture 3" descr="C:\Users\A134263\Documents\Microsoft Community\Kinect Workshop\Interfaces.png"/>
+          <p:cNvPicPr>
+            <a:picLocks noChangeAspect="1" noChangeArrowheads="1"/>
+          </p:cNvPicPr>
+          <p:nvPr/>
+        </p:nvPicPr>
+        <p:blipFill>
+          <a:blip r:embed="rId3" cstate="print">
+            <a:extLst>
+              <a:ext uri="{28A0092B-C50C-407E-A947-70E740481C1C}">
+                <a14:useLocalDpi xmlns:a14="http://schemas.microsoft.com/office/drawing/2010/main" xmlns="" val="0"/>
+              </a:ext>
+            </a:extLst>
+          </a:blip>
+          <a:srcRect/>
+          <a:stretch>
+            <a:fillRect/>
+          </a:stretch>
+        </p:blipFill>
+        <p:spPr bwMode="auto">
+          <a:xfrm>
+            <a:off x="476466" y="2018690"/>
+            <a:ext cx="3152775" cy="2409825"/>
+          </a:xfrm>
+          <a:prstGeom prst="rect">
+            <a:avLst/>
+          </a:prstGeom>
+          <a:noFill/>
+          <a:extLst>
+            <a:ext uri="{909E8E84-426E-40DD-AFC4-6F175D3DCCD1}">
+              <a14:hiddenFill xmlns:a14="http://schemas.microsoft.com/office/drawing/2010/main" xmlns="">
+                <a:solidFill>
+                  <a:srgbClr val="FFFFFF"/>
+                </a:solidFill>
+              </a14:hiddenFill>
+            </a:ext>
+          </a:extLst>
+        </p:spPr>
+      </p:pic>
+      <p:sp>
+        <p:nvSpPr>
+          <p:cNvPr id="8" name="TextBox 7"/>
+          <p:cNvSpPr txBox="1"/>
+          <p:nvPr/>
+        </p:nvSpPr>
+        <p:spPr>
+          <a:xfrm>
+            <a:off x="476466" y="5104644"/>
+            <a:ext cx="1120821" cy="369332"/>
+          </a:xfrm>
+          <a:prstGeom prst="rect">
+            <a:avLst/>
+          </a:prstGeom>
+          <a:noFill/>
+        </p:spPr>
+        <p:txBody>
+          <a:bodyPr wrap="none" rtlCol="0">
+            <a:spAutoFit/>
+          </a:bodyPr>
+          <a:lstStyle/>
+          <a:p>
+            <a:r>
+              <a:rPr lang="nl-NL" dirty="0" smtClean="0">
+                <a:solidFill>
+                  <a:schemeClr val="tx1"/>
+                </a:solidFill>
+              </a:rPr>
+              <a:t>Pipelines</a:t>
+            </a:r>
+            <a:endParaRPr lang="nl-NL" dirty="0">
+              <a:solidFill>
+                <a:schemeClr val="tx1"/>
+              </a:solidFill>
+            </a:endParaRPr>
+          </a:p>
+        </p:txBody>
+      </p:sp>
+      <p:pic>
+        <p:nvPicPr>
+          <p:cNvPr id="1029" name="Picture 5" descr="C:\Users\A134263\Documents\Microsoft Community\Kinect Workshop\Pipeline.png"/>
+          <p:cNvPicPr>
+            <a:picLocks noChangeAspect="1" noChangeArrowheads="1"/>
+          </p:cNvPicPr>
+          <p:nvPr/>
+        </p:nvPicPr>
+        <p:blipFill>
+          <a:blip r:embed="rId4" cstate="print">
+            <a:extLst>
+              <a:ext uri="{28A0092B-C50C-407E-A947-70E740481C1C}">
+                <a14:useLocalDpi xmlns:a14="http://schemas.microsoft.com/office/drawing/2010/main" xmlns="" val="0"/>
+              </a:ext>
+            </a:extLst>
+          </a:blip>
+          <a:srcRect/>
+          <a:stretch>
+            <a:fillRect/>
+          </a:stretch>
+        </p:blipFill>
+        <p:spPr bwMode="auto">
+          <a:xfrm>
+            <a:off x="476466" y="5473976"/>
+            <a:ext cx="7208838" cy="885825"/>
+          </a:xfrm>
+          <a:prstGeom prst="rect">
+            <a:avLst/>
+          </a:prstGeom>
+          <a:noFill/>
+          <a:extLst>
+            <a:ext uri="{909E8E84-426E-40DD-AFC4-6F175D3DCCD1}">
+              <a14:hiddenFill xmlns:a14="http://schemas.microsoft.com/office/drawing/2010/main" xmlns="">
+                <a:solidFill>
+                  <a:srgbClr val="FFFFFF"/>
+                </a:solidFill>
+              </a14:hiddenFill>
+            </a:ext>
+          </a:extLst>
+        </p:spPr>
+      </p:pic>
+      <p:sp>
+        <p:nvSpPr>
+          <p:cNvPr id="9" name="Afgeronde rechthoek 8"/>
+          <p:cNvSpPr/>
+          <p:nvPr/>
+        </p:nvSpPr>
+        <p:spPr bwMode="auto">
+          <a:xfrm>
+            <a:off x="6006353" y="5029200"/>
+            <a:ext cx="1990164" cy="1613647"/>
+          </a:xfrm>
+          <a:prstGeom prst="roundRect">
+            <a:avLst/>
+          </a:prstGeom>
+          <a:solidFill>
+            <a:srgbClr val="FFEC5F">
+              <a:alpha val="50196"/>
+            </a:srgbClr>
+          </a:solidFill>
+          <a:ln w="28575" cap="flat" cmpd="sng" algn="ctr">
+            <a:solidFill>
+              <a:srgbClr val="FFEC5F"/>
+            </a:solidFill>
+            <a:prstDash val="solid"/>
+            <a:round/>
+            <a:headEnd type="none" w="med" len="med"/>
+            <a:tailEnd type="none" w="med" len="med"/>
+          </a:ln>
+          <a:effectLst/>
+        </p:spPr>
+        <p:txBody>
+          <a:bodyPr vert="horz" wrap="none" lIns="0" tIns="0" rIns="0" bIns="0" numCol="1" rtlCol="0" anchor="ctr" anchorCtr="0" compatLnSpc="1">
+            <a:prstTxWarp prst="textNoShape">
+              <a:avLst/>
+            </a:prstTxWarp>
+          </a:bodyPr>
+          <a:lstStyle/>
+          <a:p>
+            <a:pPr marL="0" marR="0" indent="0" algn="ctr" defTabSz="914400" rtl="0" eaLnBrk="1" fontAlgn="base" latinLnBrk="0" hangingPunct="1">
+              <a:lnSpc>
+                <a:spcPct val="100000"/>
+              </a:lnSpc>
+              <a:spcBef>
+                <a:spcPct val="50000"/>
+              </a:spcBef>
+              <a:spcAft>
+                <a:spcPct val="0"/>
+              </a:spcAft>
+              <a:buClr>
+                <a:schemeClr val="bg2"/>
+              </a:buClr>
+              <a:buSzTx/>
+              <a:buFont typeface="Arial" charset="0"/>
+              <a:buNone/>
+              <a:tabLst/>
+            </a:pPr>
+            <a:r>
+              <a:rPr kumimoji="0" lang="nl-NL" sz="1800" b="1" i="0" u="none" strike="noStrike" cap="none" normalizeH="0" baseline="0" dirty="0" err="1" smtClean="0">
+                <a:ln>
+                  <a:noFill/>
+                </a:ln>
+                <a:solidFill>
+                  <a:schemeClr val="tx1"/>
+                </a:solidFill>
+                <a:effectLst/>
+                <a:latin typeface="Arial" charset="0"/>
+              </a:rPr>
+              <a:t>Hidden</a:t>
+            </a:r>
+            <a:r>
+              <a:rPr kumimoji="0" lang="nl-NL" sz="1800" b="1" i="0" u="none" strike="noStrike" cap="none" normalizeH="0" baseline="0" dirty="0" smtClean="0">
+                <a:ln>
+                  <a:noFill/>
+                </a:ln>
+                <a:solidFill>
+                  <a:schemeClr val="tx1"/>
+                </a:solidFill>
+                <a:effectLst/>
+                <a:latin typeface="Arial" charset="0"/>
+              </a:rPr>
+              <a:t> </a:t>
+            </a:r>
+            <a:r>
+              <a:rPr kumimoji="0" lang="nl-NL" sz="1800" b="1" i="0" u="none" strike="noStrike" cap="none" normalizeH="0" baseline="0" dirty="0" err="1" smtClean="0">
+                <a:ln>
+                  <a:noFill/>
+                </a:ln>
+                <a:solidFill>
+                  <a:schemeClr val="tx1"/>
+                </a:solidFill>
+                <a:effectLst/>
+                <a:latin typeface="Arial" charset="0"/>
+              </a:rPr>
+              <a:t>Markov</a:t>
+            </a:r>
+            <a:endParaRPr kumimoji="0" lang="nl-NL" sz="1800" b="1" i="0" u="none" strike="noStrike" cap="none" normalizeH="0" baseline="0" dirty="0" smtClean="0">
+              <a:ln>
+                <a:noFill/>
+              </a:ln>
+              <a:solidFill>
+                <a:schemeClr val="tx1"/>
+              </a:solidFill>
+              <a:effectLst/>
+              <a:latin typeface="Arial" charset="0"/>
+            </a:endParaRPr>
+          </a:p>
+        </p:txBody>
+      </p:sp>
+    </p:spTree>
+    <p:extLst>
+      <p:ext uri="{BB962C8B-B14F-4D97-AF65-F5344CB8AC3E}">
+        <p14:creationId xmlns:p14="http://schemas.microsoft.com/office/powerpoint/2010/main" xmlns="" val="630321771"/>
+      </p:ext>
+    </p:extLst>
+  </p:cSld>
+  <p:clrMapOvr>
+    <a:masterClrMapping/>
+  </p:clrMapOvr>
+  <p:timing>
+    <p:tnLst>
+      <p:par>
+        <p:cTn id="1" dur="indefinite" restart="never" nodeType="tmRoot">
+          <p:childTnLst>
+            <p:seq concurrent="1" nextAc="seek">
+              <p:cTn id="2" dur="indefinite" nodeType="mainSeq">
+                <p:childTnLst>
+                  <p:par>
+                    <p:cTn id="3" fill="hold">
+                      <p:stCondLst>
+                        <p:cond delay="indefinite"/>
+                      </p:stCondLst>
+                      <p:childTnLst>
+                        <p:par>
+                          <p:cTn id="4" fill="hold">
+                            <p:stCondLst>
+                              <p:cond delay="0"/>
+                            </p:stCondLst>
+                            <p:childTnLst>
+                              <p:par>
+                                <p:cTn id="5" presetID="3" presetClass="entr" presetSubtype="10" fill="hold" grpId="1" nodeType="clickEffect">
+                                  <p:stCondLst>
+                                    <p:cond delay="0"/>
+                                  </p:stCondLst>
+                                  <p:childTnLst>
+                                    <p:set>
+                                      <p:cBhvr>
+                                        <p:cTn id="6" dur="1" fill="hold">
+                                          <p:stCondLst>
+                                            <p:cond delay="0"/>
+                                          </p:stCondLst>
+                                        </p:cTn>
+                                        <p:tgtEl>
+                                          <p:spTgt spid="9"/>
+                                        </p:tgtEl>
+                                        <p:attrNameLst>
+                                          <p:attrName>style.visibility</p:attrName>
+                                        </p:attrNameLst>
+                                      </p:cBhvr>
+                                      <p:to>
+                                        <p:strVal val="visible"/>
+                                      </p:to>
+                                    </p:set>
+                                    <p:animEffect transition="in" filter="blinds(horizontal)">
+                                      <p:cBhvr>
+                                        <p:cTn id="7" dur="500"/>
+                                        <p:tgtEl>
+                                          <p:spTgt spid="9"/>
+                                        </p:tgtEl>
+                                      </p:cBhvr>
+                                    </p:animEffect>
+                                  </p:childTnLst>
+                                </p:cTn>
+                              </p:par>
+                            </p:childTnLst>
+                          </p:cTn>
+                        </p:par>
+                      </p:childTnLst>
+                    </p:cTn>
+                  </p:par>
+                </p:childTnLst>
+              </p:cTn>
+              <p:prevCondLst>
+                <p:cond evt="onPrev" delay="0">
+                  <p:tgtEl>
+                    <p:sldTgt/>
+                  </p:tgtEl>
+                </p:cond>
+              </p:prevCondLst>
+              <p:nextCondLst>
+                <p:cond evt="onNext" delay="0">
+                  <p:tgtEl>
+                    <p:sldTgt/>
+                  </p:tgtEl>
+                </p:cond>
+              </p:nextCondLst>
+            </p:seq>
+          </p:childTnLst>
+        </p:cTn>
+      </p:par>
+    </p:tnLst>
+    <p:bldLst>
+      <p:bldP spid="9" grpId="1" animBg="1"/>
+    </p:bldLst>
+  </p:timing>
+</p:sld>
+</file>
+
+<file path=ppt/slides/slide9.xml><?xml version="1.0" encoding="utf-8"?>
 <p:sld xmlns:a="http://schemas.openxmlformats.org/drawingml/2006/main" xmlns:r="http://schemas.openxmlformats.org/officeDocument/2006/relationships" xmlns:p="http://schemas.openxmlformats.org/presentationml/2006/main">
   <p:cSld>
     <p:spTree>

</xml_diff>